<commit_message>
More DLR slide work
</commit_message>
<xml_diff>
--- a/DLR/KDahlby.201006.KCDC.DLR.pptx
+++ b/DLR/KDahlby.201006.KCDC.DLR.pptx
@@ -4150,7 +4150,7 @@
               <a:pPr>
                 <a:defRPr/>
               </a:pPr>
-              <a:t>6/13/2010</a:t>
+              <a:t>6/18/2010</a:t>
             </a:fld>
             <a:endParaRPr lang="en-US" dirty="0"/>
           </a:p>
@@ -6543,7 +6543,7 @@
                 </a:spcAft>
                 <a:defRPr/>
               </a:pPr>
-              <a:t>6/13/2010 12:09 PM</a:t>
+              <a:t>6/18/2010 12:13 AM</a:t>
             </a:fld>
             <a:endParaRPr lang="en-US"/>
           </a:p>
@@ -7650,7 +7650,7 @@
               <a:pPr>
                 <a:defRPr/>
               </a:pPr>
-              <a:t>6/13/2010</a:t>
+              <a:t>6/18/2010</a:t>
             </a:fld>
             <a:endParaRPr lang="en-US"/>
           </a:p>
@@ -7845,7 +7845,7 @@
               <a:pPr>
                 <a:defRPr/>
               </a:pPr>
-              <a:t>6/13/2010</a:t>
+              <a:t>6/18/2010</a:t>
             </a:fld>
             <a:endParaRPr lang="en-US" dirty="0"/>
           </a:p>
@@ -8050,7 +8050,7 @@
               <a:pPr>
                 <a:defRPr/>
               </a:pPr>
-              <a:t>6/13/2010</a:t>
+              <a:t>6/18/2010</a:t>
             </a:fld>
             <a:endParaRPr lang="en-US" dirty="0"/>
           </a:p>
@@ -8438,7 +8438,7 @@
               <a:pPr>
                 <a:defRPr/>
               </a:pPr>
-              <a:t>6/13/2010</a:t>
+              <a:t>6/18/2010</a:t>
             </a:fld>
             <a:endParaRPr lang="en-US" dirty="0"/>
           </a:p>
@@ -8710,7 +8710,7 @@
               <a:pPr>
                 <a:defRPr/>
               </a:pPr>
-              <a:t>6/13/2010</a:t>
+              <a:t>6/18/2010</a:t>
             </a:fld>
             <a:endParaRPr lang="en-US"/>
           </a:p>
@@ -9004,7 +9004,7 @@
               <a:pPr>
                 <a:defRPr/>
               </a:pPr>
-              <a:t>6/13/2010</a:t>
+              <a:t>6/18/2010</a:t>
             </a:fld>
             <a:endParaRPr lang="en-US" dirty="0"/>
           </a:p>
@@ -9412,7 +9412,7 @@
               <a:pPr>
                 <a:defRPr/>
               </a:pPr>
-              <a:t>6/13/2010</a:t>
+              <a:t>6/18/2010</a:t>
             </a:fld>
             <a:endParaRPr lang="en-US" dirty="0"/>
           </a:p>
@@ -9592,7 +9592,7 @@
               <a:pPr>
                 <a:defRPr/>
               </a:pPr>
-              <a:t>6/13/2010</a:t>
+              <a:t>6/18/2010</a:t>
             </a:fld>
             <a:endParaRPr lang="en-US" dirty="0"/>
           </a:p>
@@ -9712,7 +9712,7 @@
               <a:pPr>
                 <a:defRPr/>
               </a:pPr>
-              <a:t>6/13/2010</a:t>
+              <a:t>6/18/2010</a:t>
             </a:fld>
             <a:endParaRPr lang="en-US" dirty="0"/>
           </a:p>
@@ -10003,7 +10003,7 @@
               <a:pPr>
                 <a:defRPr/>
               </a:pPr>
-              <a:t>6/13/2010</a:t>
+              <a:t>6/18/2010</a:t>
             </a:fld>
             <a:endParaRPr lang="en-US" dirty="0"/>
           </a:p>
@@ -10648,7 +10648,7 @@
               <a:pPr>
                 <a:defRPr/>
               </a:pPr>
-              <a:t>6/13/2010</a:t>
+              <a:t>6/18/2010</a:t>
             </a:fld>
             <a:endParaRPr lang="en-US"/>
           </a:p>
@@ -11173,7 +11173,7 @@
               <a:pPr>
                 <a:defRPr/>
               </a:pPr>
-              <a:t>6/13/2010</a:t>
+              <a:t>6/18/2010</a:t>
             </a:fld>
             <a:endParaRPr lang="en-US" dirty="0"/>
           </a:p>
@@ -15672,6 +15672,9 @@
           <a:solidFill>
             <a:srgbClr val="FFFF99"/>
           </a:solidFill>
+          <a:ln>
+            <a:noFill/>
+          </a:ln>
         </p:spPr>
         <p:style>
           <a:lnRef idx="1">
@@ -16065,6 +16068,9 @@
           <a:solidFill>
             <a:srgbClr val="FFFF99"/>
           </a:solidFill>
+          <a:ln>
+            <a:noFill/>
+          </a:ln>
         </p:spPr>
         <p:style>
           <a:lnRef idx="1">
@@ -16239,6 +16245,9 @@
           <a:solidFill>
             <a:srgbClr val="FFFF99"/>
           </a:solidFill>
+          <a:ln>
+            <a:noFill/>
+          </a:ln>
         </p:spPr>
         <p:style>
           <a:lnRef idx="1">
@@ -16448,7 +16457,6 @@
               <a:rPr lang="en-US" smtClean="0"/>
               <a:t>Dynamically Typed Objects</a:t>
             </a:r>
-            <a:endParaRPr lang="en-US" smtClean="0"/>
           </a:p>
         </p:txBody>
       </p:sp>
@@ -17047,6 +17055,9 @@
           <a:solidFill>
             <a:srgbClr val="FFFF99"/>
           </a:solidFill>
+          <a:ln>
+            <a:noFill/>
+          </a:ln>
         </p:spPr>
         <p:style>
           <a:lnRef idx="1">
@@ -17792,6 +17803,9 @@
           <a:solidFill>
             <a:srgbClr val="FFFF99"/>
           </a:solidFill>
+          <a:ln>
+            <a:noFill/>
+          </a:ln>
         </p:spPr>
         <p:style>
           <a:lnRef idx="1">
@@ -17944,6 +17958,9 @@
           <a:solidFill>
             <a:srgbClr val="FFFF99"/>
           </a:solidFill>
+          <a:ln>
+            <a:noFill/>
+          </a:ln>
         </p:spPr>
         <p:style>
           <a:lnRef idx="1">
@@ -18216,6 +18233,9 @@
           <a:solidFill>
             <a:srgbClr val="FFFF99"/>
           </a:solidFill>
+          <a:ln>
+            <a:noFill/>
+          </a:ln>
         </p:spPr>
         <p:style>
           <a:lnRef idx="1">
@@ -18859,7 +18879,6 @@
               <a:rPr lang="en-US" smtClean="0"/>
               <a:t> in a Nutshell</a:t>
             </a:r>
-            <a:endParaRPr lang="en-US" smtClean="0"/>
           </a:p>
         </p:txBody>
       </p:sp>
@@ -19190,6 +19209,9 @@
           <a:solidFill>
             <a:srgbClr val="FFFF99"/>
           </a:solidFill>
+          <a:ln>
+            <a:noFill/>
+          </a:ln>
         </p:spPr>
         <p:style>
           <a:lnRef idx="1">
@@ -19273,9 +19295,9 @@
                 <a:ea typeface="Calibri"/>
                 <a:cs typeface="Times New Roman"/>
               </a:rPr>
-              <a:t> </a:t>
-            </a:r>
-            <a:r>
+              <a:t> value)</a:t>
+            </a:r>
+            <a:br>
               <a:rPr lang="en-US" sz="1600" dirty="0" smtClean="0">
                 <a:solidFill>
                   <a:srgbClr val="080808"/>
@@ -19284,9 +19306,8 @@
                 <a:ea typeface="Calibri"/>
                 <a:cs typeface="Times New Roman"/>
               </a:rPr>
-              <a:t>value)</a:t>
-            </a:r>
-            <a:br>
+            </a:br>
+            <a:r>
               <a:rPr lang="en-US" sz="1600" dirty="0" smtClean="0">
                 <a:solidFill>
                   <a:srgbClr val="080808"/>
@@ -19295,8 +19316,9 @@
                 <a:ea typeface="Calibri"/>
                 <a:cs typeface="Times New Roman"/>
               </a:rPr>
-            </a:br>
-            <a:r>
+              <a:t>{</a:t>
+            </a:r>
+            <a:br>
               <a:rPr lang="en-US" sz="1600" dirty="0" smtClean="0">
                 <a:solidFill>
                   <a:srgbClr val="080808"/>
@@ -19305,8 +19327,7 @@
                 <a:ea typeface="Calibri"/>
                 <a:cs typeface="Times New Roman"/>
               </a:rPr>
-              <a:t>{</a:t>
-            </a:r>
+            </a:br>
             <a:r>
               <a:rPr lang="en-US" sz="1600" dirty="0" smtClean="0">
                 <a:solidFill>
@@ -19316,83 +19337,51 @@
                 <a:ea typeface="Calibri"/>
                 <a:cs typeface="Times New Roman"/>
               </a:rPr>
-              <a:t/>
-            </a:r>
-            <a:br>
-              <a:rPr lang="en-US" sz="1600" dirty="0" smtClean="0">
-                <a:solidFill>
-                  <a:srgbClr val="080808"/>
+              <a:t>   </a:t>
+            </a:r>
+            <a:r>
+              <a:rPr lang="en-US" sz="1600" dirty="0" err="1" smtClean="0">
+                <a:solidFill>
+                  <a:srgbClr val="0000FF"/>
                 </a:solidFill>
                 <a:latin typeface="Consolas" pitchFamily="49" charset="0"/>
                 <a:ea typeface="Calibri"/>
                 <a:cs typeface="Times New Roman"/>
               </a:rPr>
-            </a:br>
+              <a:t>var</a:t>
+            </a:r>
             <a:r>
               <a:rPr lang="en-US" sz="1600" dirty="0" smtClean="0">
                 <a:solidFill>
-                  <a:srgbClr val="080808"/>
+                  <a:srgbClr val="0000FF"/>
                 </a:solidFill>
                 <a:latin typeface="Consolas" pitchFamily="49" charset="0"/>
                 <a:ea typeface="Calibri"/>
                 <a:cs typeface="Times New Roman"/>
               </a:rPr>
-              <a:t>   </a:t>
+              <a:t> </a:t>
             </a:r>
             <a:r>
               <a:rPr lang="en-US" sz="1600" dirty="0" err="1" smtClean="0">
                 <a:solidFill>
-                  <a:srgbClr val="0000FF"/>
+                  <a:srgbClr val="080808"/>
                 </a:solidFill>
                 <a:latin typeface="Consolas" pitchFamily="49" charset="0"/>
                 <a:ea typeface="Calibri"/>
                 <a:cs typeface="Times New Roman"/>
               </a:rPr>
-              <a:t>var</a:t>
+              <a:t>inferMePlz</a:t>
             </a:r>
             <a:r>
               <a:rPr lang="en-US" sz="1600" dirty="0" smtClean="0">
                 <a:solidFill>
-                  <a:srgbClr val="0000FF"/>
+                  <a:srgbClr val="080808"/>
                 </a:solidFill>
                 <a:latin typeface="Consolas" pitchFamily="49" charset="0"/>
                 <a:ea typeface="Calibri"/>
                 <a:cs typeface="Times New Roman"/>
               </a:rPr>
-              <a:t> </a:t>
-            </a:r>
-            <a:r>
-              <a:rPr lang="en-US" sz="1600" dirty="0" err="1" smtClean="0">
-                <a:solidFill>
-                  <a:srgbClr val="080808"/>
-                </a:solidFill>
-                <a:latin typeface="Consolas" pitchFamily="49" charset="0"/>
-                <a:ea typeface="Calibri"/>
-                <a:cs typeface="Times New Roman"/>
-              </a:rPr>
-              <a:t>inferMePlz</a:t>
-            </a:r>
-            <a:r>
-              <a:rPr lang="en-US" sz="1600" dirty="0" smtClean="0">
-                <a:solidFill>
-                  <a:srgbClr val="080808"/>
-                </a:solidFill>
-                <a:latin typeface="Consolas" pitchFamily="49" charset="0"/>
-                <a:ea typeface="Calibri"/>
-                <a:cs typeface="Times New Roman"/>
-              </a:rPr>
               <a:t> = value; </a:t>
-            </a:r>
-            <a:r>
-              <a:rPr lang="en-US" sz="1600" dirty="0" smtClean="0">
-                <a:solidFill>
-                  <a:srgbClr val="080808"/>
-                </a:solidFill>
-                <a:latin typeface="Consolas" pitchFamily="49" charset="0"/>
-                <a:ea typeface="Calibri"/>
-                <a:cs typeface="Times New Roman"/>
-              </a:rPr>
-              <a:t/>
             </a:r>
             <a:br>
               <a:rPr lang="en-US" sz="1600" dirty="0" smtClean="0">
@@ -19854,7 +19843,6 @@
               <a:rPr lang="en-US" smtClean="0"/>
               <a:t>Dynamic in Visual Basic 10</a:t>
             </a:r>
-            <a:endParaRPr lang="en-US" smtClean="0"/>
           </a:p>
         </p:txBody>
       </p:sp>
@@ -24977,9 +24965,6 @@
                         </a:rPr>
                         <a:t>*</a:t>
                       </a:r>
-                      <a:endParaRPr lang="en-US" sz="1600" baseline="30000" dirty="0" smtClean="0">
-                        <a:latin typeface="Consolas" pitchFamily="49" charset="0"/>
-                      </a:endParaRPr>
                     </a:p>
                   </a:txBody>
                   <a:tcPr marT="18288" marB="18288">
@@ -25902,13 +25887,7 @@
                         <a:rPr lang="en-US" sz="1600" dirty="0" smtClean="0">
                           <a:latin typeface="Consolas" pitchFamily="49" charset="0"/>
                         </a:rPr>
-                        <a:t>New </a:t>
-                      </a:r>
-                      <a:r>
-                        <a:rPr lang="en-US" sz="1600" dirty="0" smtClean="0">
-                          <a:latin typeface="Consolas" pitchFamily="49" charset="0"/>
-                        </a:rPr>
-                        <a:t>X(</a:t>
+                        <a:t>New X(</a:t>
                       </a:r>
                       <a:r>
                         <a:rPr lang="en-US" sz="1600" dirty="0" err="1" smtClean="0">
@@ -27071,7 +27050,6 @@
               <a:rPr lang="en-US" smtClean="0"/>
               <a:t>System.Linq.Expressions v2</a:t>
             </a:r>
-            <a:endParaRPr lang="en-US" smtClean="0"/>
           </a:p>
         </p:txBody>
       </p:sp>
@@ -27092,15 +27070,7 @@
           <a:p>
             <a:r>
               <a:rPr lang="en-US" dirty="0" smtClean="0"/>
-              <a:t>.</a:t>
-            </a:r>
-            <a:r>
-              <a:rPr lang="en-US" dirty="0" smtClean="0"/>
-              <a:t>NET 3.5 </a:t>
-            </a:r>
-            <a:r>
-              <a:rPr lang="en-US" dirty="0" smtClean="0"/>
-              <a:t>Expression Trees</a:t>
+              <a:t>.NET 3.5 Expression Trees</a:t>
             </a:r>
           </a:p>
           <a:p>
@@ -27155,7 +27125,6 @@
               <a:rPr lang="en-US" dirty="0" smtClean="0"/>
               <a:t>Assignment</a:t>
             </a:r>
-            <a:endParaRPr lang="en-US" dirty="0" smtClean="0"/>
           </a:p>
           <a:p>
             <a:pPr lvl="1">
@@ -27163,19 +27132,7 @@
             </a:pPr>
             <a:r>
               <a:rPr lang="en-US" sz="2000" dirty="0" smtClean="0"/>
-              <a:t>=, +=, </a:t>
-            </a:r>
-            <a:r>
-              <a:rPr lang="en-US" sz="2000" dirty="0" smtClean="0"/>
-              <a:t>-=, *=, /=, </a:t>
-            </a:r>
-            <a:r>
-              <a:rPr lang="en-US" sz="2000" dirty="0" smtClean="0"/>
-              <a:t>%=, </a:t>
-            </a:r>
-            <a:r>
-              <a:rPr lang="en-US" sz="2000" dirty="0" smtClean="0"/>
-              <a:t>&amp;=, |=, ^=, &lt;&lt;=, &gt;&gt;=, etc</a:t>
+              <a:t>=, +=, -=, *=, /=, %=, &amp;=, |=, ^=, &lt;&lt;=, &gt;&gt;=, etc</a:t>
             </a:r>
           </a:p>
           <a:p>
@@ -27194,23 +27151,7 @@
             </a:pPr>
             <a:r>
               <a:rPr lang="en-US" sz="2000" dirty="0" smtClean="0"/>
-              <a:t>if, switch, for</a:t>
-            </a:r>
-            <a:r>
-              <a:rPr lang="en-US" sz="2000" dirty="0" smtClean="0"/>
-              <a:t>, </a:t>
-            </a:r>
-            <a:r>
-              <a:rPr lang="en-US" sz="2000" dirty="0" smtClean="0"/>
-              <a:t>break, </a:t>
-            </a:r>
-            <a:r>
-              <a:rPr lang="en-US" sz="2000" dirty="0" smtClean="0"/>
-              <a:t>return, throw, </a:t>
-            </a:r>
-            <a:r>
-              <a:rPr lang="en-US" sz="2000" dirty="0" smtClean="0"/>
-              <a:t>try…catch..finally, </a:t>
+              <a:t>if, switch, for, break, return, throw, try…catch..finally, </a:t>
             </a:r>
             <a:r>
               <a:rPr lang="en-US" sz="2000" dirty="0" err="1" smtClean="0"/>
@@ -29069,48 +29010,77 @@
         </p:nvSpPr>
         <p:spPr bwMode="auto">
           <a:xfrm>
-            <a:off x="4953000" y="1905000"/>
-            <a:ext cx="3810000" cy="1816100"/>
+            <a:off x="5029200" y="1905000"/>
+            <a:ext cx="3733800" cy="1816100"/>
           </a:xfrm>
           <a:prstGeom prst="rect">
             <a:avLst/>
           </a:prstGeom>
           <a:solidFill>
-            <a:schemeClr val="bg1"/>
+            <a:srgbClr val="FFFF99"/>
           </a:solidFill>
           <a:ln w="12700">
-            <a:solidFill>
-              <a:schemeClr val="tx1"/>
-            </a:solidFill>
+            <a:noFill/>
             <a:miter lim="800000"/>
             <a:headEnd/>
             <a:tailEnd/>
           </a:ln>
+          <a:effectLst>
+            <a:outerShdw blurRad="50800" dist="38100" dir="5400000" algn="t" rotWithShape="0">
+              <a:prstClr val="black">
+                <a:alpha val="40000"/>
+              </a:prstClr>
+            </a:outerShdw>
+          </a:effectLst>
         </p:spPr>
         <p:txBody>
-          <a:bodyPr lIns="91435" tIns="45718" rIns="91435" bIns="45718">
+          <a:bodyPr wrap="square" lIns="91435" tIns="45718" rIns="91435" bIns="45718">
             <a:spAutoFit/>
           </a:bodyPr>
           <a:lstStyle/>
           <a:p>
             <a:r>
-              <a:rPr lang="en-US" sz="1600">
+              <a:rPr lang="en-US" sz="1600" dirty="0">
                 <a:latin typeface="Consolas" pitchFamily="49" charset="0"/>
               </a:rPr>
-              <a:t>static int fact(int n) {</a:t>
-            </a:r>
-          </a:p>
-          <a:p>
-            <a:r>
-              <a:rPr lang="en-US" sz="1600">
+              <a:t>static </a:t>
+            </a:r>
+            <a:r>
+              <a:rPr lang="en-US" sz="1600" dirty="0" err="1">
                 <a:latin typeface="Consolas" pitchFamily="49" charset="0"/>
               </a:rPr>
+              <a:t>int</a:t>
+            </a:r>
+            <a:r>
+              <a:rPr lang="en-US" sz="1600" dirty="0">
+                <a:latin typeface="Consolas" pitchFamily="49" charset="0"/>
+              </a:rPr>
+              <a:t> fact(</a:t>
+            </a:r>
+            <a:r>
+              <a:rPr lang="en-US" sz="1600" dirty="0" err="1">
+                <a:latin typeface="Consolas" pitchFamily="49" charset="0"/>
+              </a:rPr>
+              <a:t>int</a:t>
+            </a:r>
+            <a:r>
+              <a:rPr lang="en-US" sz="1600" dirty="0">
+                <a:latin typeface="Consolas" pitchFamily="49" charset="0"/>
+              </a:rPr>
+              <a:t> n) {</a:t>
+            </a:r>
+          </a:p>
+          <a:p>
+            <a:r>
+              <a:rPr lang="en-US" sz="1600" dirty="0">
+                <a:latin typeface="Consolas" pitchFamily="49" charset="0"/>
+              </a:rPr>
               <a:t>    if (n == 0) {</a:t>
             </a:r>
           </a:p>
           <a:p>
             <a:r>
-              <a:rPr lang="en-US" sz="1600">
+              <a:rPr lang="en-US" sz="1600" dirty="0">
                 <a:latin typeface="Consolas" pitchFamily="49" charset="0"/>
               </a:rPr>
               <a:t>        return 1;</a:t>
@@ -29118,7 +29088,7 @@
           </a:p>
           <a:p>
             <a:r>
-              <a:rPr lang="en-US" sz="1600">
+              <a:rPr lang="en-US" sz="1600" dirty="0">
                 <a:latin typeface="Consolas" pitchFamily="49" charset="0"/>
               </a:rPr>
               <a:t>    } else {</a:t>
@@ -29126,7 +29096,7 @@
           </a:p>
           <a:p>
             <a:r>
-              <a:rPr lang="en-US" sz="1600">
+              <a:rPr lang="en-US" sz="1600" dirty="0">
                 <a:latin typeface="Consolas" pitchFamily="49" charset="0"/>
               </a:rPr>
               <a:t>        return n * fact(n - 1);</a:t>
@@ -29134,7 +29104,7 @@
           </a:p>
           <a:p>
             <a:r>
-              <a:rPr lang="en-US" sz="1600">
+              <a:rPr lang="en-US" sz="1600" dirty="0">
                 <a:latin typeface="Consolas" pitchFamily="49" charset="0"/>
               </a:rPr>
               <a:t>    }</a:t>
@@ -29142,7 +29112,7 @@
           </a:p>
           <a:p>
             <a:r>
-              <a:rPr lang="en-US" sz="1600">
+              <a:rPr lang="en-US" sz="1600" dirty="0">
                 <a:latin typeface="Consolas" pitchFamily="49" charset="0"/>
               </a:rPr>
               <a:t>}</a:t>
@@ -30469,32 +30439,37 @@
         </p:nvSpPr>
         <p:spPr bwMode="auto">
           <a:xfrm>
-            <a:off x="4953000" y="1905000"/>
-            <a:ext cx="3810000" cy="1816100"/>
+            <a:off x="5029200" y="1905000"/>
+            <a:ext cx="3733800" cy="1815878"/>
           </a:xfrm>
           <a:prstGeom prst="rect">
             <a:avLst/>
           </a:prstGeom>
           <a:solidFill>
-            <a:schemeClr val="bg1"/>
+            <a:srgbClr val="FFFF99"/>
           </a:solidFill>
           <a:ln w="12700">
-            <a:solidFill>
-              <a:schemeClr val="tx1"/>
-            </a:solidFill>
+            <a:noFill/>
             <a:miter lim="800000"/>
             <a:headEnd/>
             <a:tailEnd/>
           </a:ln>
+          <a:effectLst>
+            <a:outerShdw blurRad="50800" dist="38100" dir="5400000" algn="t" rotWithShape="0">
+              <a:prstClr val="black">
+                <a:alpha val="40000"/>
+              </a:prstClr>
+            </a:outerShdw>
+          </a:effectLst>
         </p:spPr>
         <p:txBody>
-          <a:bodyPr lIns="91435" tIns="45718" rIns="91435" bIns="45718">
+          <a:bodyPr wrap="square" lIns="91435" tIns="45718" rIns="0" bIns="45718">
             <a:spAutoFit/>
           </a:bodyPr>
           <a:lstStyle/>
           <a:p>
             <a:r>
-              <a:rPr lang="en-US" sz="1600">
+              <a:rPr lang="en-US" sz="1600" dirty="0">
                 <a:latin typeface="Consolas" pitchFamily="49" charset="0"/>
               </a:rPr>
               <a:t>static dynamic fact(dynamic n) {</a:t>
@@ -30502,7 +30477,7 @@
           </a:p>
           <a:p>
             <a:r>
-              <a:rPr lang="en-US" sz="1600">
+              <a:rPr lang="en-US" sz="1600" dirty="0">
                 <a:latin typeface="Consolas" pitchFamily="49" charset="0"/>
               </a:rPr>
               <a:t>    if (n == 0) {</a:t>
@@ -30510,7 +30485,7 @@
           </a:p>
           <a:p>
             <a:r>
-              <a:rPr lang="en-US" sz="1600">
+              <a:rPr lang="en-US" sz="1600" dirty="0">
                 <a:latin typeface="Consolas" pitchFamily="49" charset="0"/>
               </a:rPr>
               <a:t>        return 1;</a:t>
@@ -30518,7 +30493,7 @@
           </a:p>
           <a:p>
             <a:r>
-              <a:rPr lang="en-US" sz="1600">
+              <a:rPr lang="en-US" sz="1600" dirty="0">
                 <a:latin typeface="Consolas" pitchFamily="49" charset="0"/>
               </a:rPr>
               <a:t>    } else {</a:t>
@@ -30526,7 +30501,7 @@
           </a:p>
           <a:p>
             <a:r>
-              <a:rPr lang="en-US" sz="1600">
+              <a:rPr lang="en-US" sz="1600" dirty="0">
                 <a:latin typeface="Consolas" pitchFamily="49" charset="0"/>
               </a:rPr>
               <a:t>        return n * fact(n - 1);</a:t>
@@ -30534,7 +30509,7 @@
           </a:p>
           <a:p>
             <a:r>
-              <a:rPr lang="en-US" sz="1600">
+              <a:rPr lang="en-US" sz="1600" dirty="0">
                 <a:latin typeface="Consolas" pitchFamily="49" charset="0"/>
               </a:rPr>
               <a:t>    }</a:t>
@@ -30542,7 +30517,7 @@
           </a:p>
           <a:p>
             <a:r>
-              <a:rPr lang="en-US" sz="1600">
+              <a:rPr lang="en-US" sz="1600" dirty="0">
                 <a:latin typeface="Consolas" pitchFamily="49" charset="0"/>
               </a:rPr>
               <a:t>}</a:t>
@@ -30700,26 +30675,31 @@
         </p:nvSpPr>
         <p:spPr bwMode="auto">
           <a:xfrm>
-            <a:off x="5181600" y="1905000"/>
-            <a:ext cx="3581400" cy="1323975"/>
+            <a:off x="5029200" y="1905000"/>
+            <a:ext cx="3733800" cy="1323975"/>
           </a:xfrm>
           <a:prstGeom prst="rect">
             <a:avLst/>
           </a:prstGeom>
           <a:solidFill>
-            <a:schemeClr val="bg1"/>
+            <a:srgbClr val="FFFF99"/>
           </a:solidFill>
           <a:ln w="12700">
-            <a:solidFill>
-              <a:schemeClr val="tx1"/>
-            </a:solidFill>
+            <a:noFill/>
             <a:miter lim="800000"/>
             <a:headEnd/>
             <a:tailEnd/>
           </a:ln>
+          <a:effectLst>
+            <a:outerShdw blurRad="50800" dist="38100" dir="5400000" algn="t" rotWithShape="0">
+              <a:prstClr val="black">
+                <a:alpha val="40000"/>
+              </a:prstClr>
+            </a:outerShdw>
+          </a:effectLst>
         </p:spPr>
         <p:txBody>
-          <a:bodyPr lIns="91435" tIns="45718" rIns="91435" bIns="45718">
+          <a:bodyPr wrap="square" lIns="91435" tIns="45718" rIns="91435" bIns="45718">
             <a:spAutoFit/>
           </a:bodyPr>
           <a:lstStyle/>
@@ -32364,32 +32344,37 @@
         </p:nvSpPr>
         <p:spPr bwMode="auto">
           <a:xfrm>
-            <a:off x="5334000" y="1905000"/>
-            <a:ext cx="3429000" cy="1816100"/>
+            <a:off x="5029200" y="1905000"/>
+            <a:ext cx="3733800" cy="1816100"/>
           </a:xfrm>
           <a:prstGeom prst="rect">
             <a:avLst/>
           </a:prstGeom>
           <a:solidFill>
-            <a:schemeClr val="bg1"/>
+            <a:srgbClr val="FFFF99"/>
           </a:solidFill>
           <a:ln w="12700">
-            <a:solidFill>
-              <a:schemeClr val="tx1"/>
-            </a:solidFill>
+            <a:noFill/>
             <a:miter lim="800000"/>
             <a:headEnd/>
             <a:tailEnd/>
           </a:ln>
+          <a:effectLst>
+            <a:outerShdw blurRad="50800" dist="38100" dir="5400000" algn="t" rotWithShape="0">
+              <a:prstClr val="black">
+                <a:alpha val="40000"/>
+              </a:prstClr>
+            </a:outerShdw>
+          </a:effectLst>
         </p:spPr>
         <p:txBody>
-          <a:bodyPr lIns="91435" tIns="45718" rIns="91435" bIns="45718">
+          <a:bodyPr wrap="square" lIns="91435" tIns="45718" rIns="91435" bIns="45718">
             <a:spAutoFit/>
           </a:bodyPr>
           <a:lstStyle/>
           <a:p>
             <a:r>
-              <a:rPr lang="en-US" sz="1600">
+              <a:rPr lang="en-US" sz="1600" dirty="0">
                 <a:latin typeface="Consolas" pitchFamily="49" charset="0"/>
               </a:rPr>
               <a:t>def fact(n)</a:t>
@@ -32397,7 +32382,7 @@
           </a:p>
           <a:p>
             <a:r>
-              <a:rPr lang="en-US" sz="1600">
+              <a:rPr lang="en-US" sz="1600" dirty="0">
                 <a:latin typeface="Consolas" pitchFamily="49" charset="0"/>
               </a:rPr>
               <a:t>    if n == 0</a:t>
@@ -32405,7 +32390,7 @@
           </a:p>
           <a:p>
             <a:r>
-              <a:rPr lang="en-US" sz="1600">
+              <a:rPr lang="en-US" sz="1600" dirty="0">
                 <a:latin typeface="Consolas" pitchFamily="49" charset="0"/>
               </a:rPr>
               <a:t>        1</a:t>
@@ -32413,7 +32398,7 @@
           </a:p>
           <a:p>
             <a:r>
-              <a:rPr lang="en-US" sz="1600">
+              <a:rPr lang="en-US" sz="1600" dirty="0">
                 <a:latin typeface="Consolas" pitchFamily="49" charset="0"/>
               </a:rPr>
               <a:t>    else</a:t>
@@ -32421,7 +32406,7 @@
           </a:p>
           <a:p>
             <a:r>
-              <a:rPr lang="en-US" sz="1600">
+              <a:rPr lang="en-US" sz="1600" dirty="0">
                 <a:latin typeface="Consolas" pitchFamily="49" charset="0"/>
               </a:rPr>
               <a:t>        n * fact(n - 1)</a:t>
@@ -32429,7 +32414,7 @@
           </a:p>
           <a:p>
             <a:r>
-              <a:rPr lang="en-US" sz="1600">
+              <a:rPr lang="en-US" sz="1600" dirty="0">
                 <a:latin typeface="Consolas" pitchFamily="49" charset="0"/>
               </a:rPr>
               <a:t>    end</a:t>
@@ -32437,7 +32422,7 @@
           </a:p>
           <a:p>
             <a:r>
-              <a:rPr lang="en-US" sz="1600">
+              <a:rPr lang="en-US" sz="1600" dirty="0">
                 <a:latin typeface="Consolas" pitchFamily="49" charset="0"/>
               </a:rPr>
               <a:t>end</a:t>
@@ -32528,7 +32513,7 @@
         <p:spPr bwMode="auto">
           <a:xfrm>
             <a:off x="3810000" y="2362200"/>
-            <a:ext cx="1143000" cy="457200"/>
+            <a:ext cx="1066800" cy="457200"/>
           </a:xfrm>
           <a:prstGeom prst="roundRect">
             <a:avLst/>
@@ -33197,10 +33182,7 @@
       <p:cxnSp>
         <p:nvCxnSpPr>
           <p:cNvPr id="26" name="Elbow Connector 25"/>
-          <p:cNvCxnSpPr>
-            <a:stCxn id="0" idx="3"/>
-            <a:endCxn id="0" idx="1"/>
-          </p:cNvCxnSpPr>
+          <p:cNvCxnSpPr/>
           <p:nvPr/>
         </p:nvCxnSpPr>
         <p:spPr>
@@ -33879,25 +33861,6 @@
       </p:sp>
       <p:sp>
         <p:nvSpPr>
-          <p:cNvPr id="12" name="Content Placeholder 11"/>
-          <p:cNvSpPr>
-            <a:spLocks noGrp="1"/>
-          </p:cNvSpPr>
-          <p:nvPr>
-            <p:ph idx="1"/>
-          </p:nvPr>
-        </p:nvSpPr>
-        <p:spPr/>
-        <p:txBody>
-          <a:bodyPr/>
-          <a:lstStyle/>
-          <a:p>
-            <a:endParaRPr lang="en-US"/>
-          </a:p>
-        </p:txBody>
-      </p:sp>
-      <p:sp>
-        <p:nvSpPr>
           <p:cNvPr id="6" name="Rectangle 5"/>
           <p:cNvSpPr>
             <a:spLocks noChangeArrowheads="1"/>
@@ -33912,9 +33875,7 @@
           <a:prstGeom prst="rect">
             <a:avLst/>
           </a:prstGeom>
-          <a:solidFill>
-            <a:srgbClr val="FFFFFF"/>
-          </a:solidFill>
+          <a:noFill/>
           <a:ln w="9525">
             <a:noFill/>
             <a:miter lim="800000"/>
@@ -33965,9 +33926,7 @@
           <a:prstGeom prst="rect">
             <a:avLst/>
           </a:prstGeom>
-          <a:solidFill>
-            <a:srgbClr val="FFFFFF"/>
-          </a:solidFill>
+          <a:noFill/>
           <a:ln w="9525">
             <a:noFill/>
             <a:miter lim="800000"/>
@@ -34028,9 +33987,7 @@
           <a:prstGeom prst="rect">
             <a:avLst/>
           </a:prstGeom>
-          <a:solidFill>
-            <a:srgbClr val="FFFFFF"/>
-          </a:solidFill>
+          <a:noFill/>
           <a:ln w="9525">
             <a:noFill/>
             <a:miter lim="800000"/>
@@ -34101,9 +34058,7 @@
           <a:prstGeom prst="rect">
             <a:avLst/>
           </a:prstGeom>
-          <a:solidFill>
-            <a:srgbClr val="FFFFFF"/>
-          </a:solidFill>
+          <a:noFill/>
           <a:ln w="9525">
             <a:noFill/>
             <a:miter lim="800000"/>
@@ -34174,9 +34129,7 @@
           <a:prstGeom prst="rect">
             <a:avLst/>
           </a:prstGeom>
-          <a:solidFill>
-            <a:srgbClr val="FFFFFF"/>
-          </a:solidFill>
+          <a:noFill/>
           <a:ln w="9525">
             <a:noFill/>
             <a:miter lim="800000"/>
@@ -34267,9 +34220,7 @@
           <a:prstGeom prst="rect">
             <a:avLst/>
           </a:prstGeom>
-          <a:solidFill>
-            <a:srgbClr val="FFFFFF"/>
-          </a:solidFill>
+          <a:noFill/>
           <a:ln w="9525">
             <a:noFill/>
             <a:miter lim="800000"/>
@@ -34687,35 +34638,6 @@
                                         </p:cTn>
                                         <p:tgtEl>
                                           <p:spTgt spid="11">
-                                            <p:bg/>
-                                          </p:spTgt>
-                                        </p:tgtEl>
-                                        <p:attrNameLst>
-                                          <p:attrName>style.visibility</p:attrName>
-                                        </p:attrNameLst>
-                                      </p:cBhvr>
-                                      <p:to>
-                                        <p:strVal val="visible"/>
-                                      </p:to>
-                                    </p:set>
-                                  </p:childTnLst>
-                                </p:cTn>
-                              </p:par>
-                              <p:par>
-                                <p:cTn id="23" presetID="1" presetClass="entr" presetSubtype="0" fill="hold" grpId="0" nodeType="withEffect">
-                                  <p:stCondLst>
-                                    <p:cond delay="0"/>
-                                  </p:stCondLst>
-                                  <p:childTnLst>
-                                    <p:set>
-                                      <p:cBhvr>
-                                        <p:cTn id="24" dur="1" fill="hold">
-                                          <p:stCondLst>
-                                            <p:cond delay="0"/>
-                                          </p:stCondLst>
-                                        </p:cTn>
-                                        <p:tgtEl>
-                                          <p:spTgt spid="11">
                                             <p:txEl>
                                               <p:pRg st="0" end="0"/>
                                             </p:txEl>
@@ -34739,26 +34661,26 @@
                     </p:cTn>
                   </p:par>
                   <p:par>
-                    <p:cTn id="25" fill="hold">
+                    <p:cTn id="23" fill="hold">
                       <p:stCondLst>
                         <p:cond delay="indefinite"/>
                       </p:stCondLst>
                       <p:childTnLst>
                         <p:par>
-                          <p:cTn id="26" fill="hold">
+                          <p:cTn id="24" fill="hold">
                             <p:stCondLst>
                               <p:cond delay="0"/>
                             </p:stCondLst>
                             <p:childTnLst>
                               <p:par>
-                                <p:cTn id="27" presetID="1" presetClass="entr" presetSubtype="0" fill="hold" grpId="0" nodeType="clickEffect">
+                                <p:cTn id="25" presetID="1" presetClass="entr" presetSubtype="0" fill="hold" grpId="0" nodeType="clickEffect">
                                   <p:stCondLst>
                                     <p:cond delay="0"/>
                                   </p:stCondLst>
                                   <p:childTnLst>
                                     <p:set>
                                       <p:cBhvr>
-                                        <p:cTn id="28" dur="1" fill="hold">
+                                        <p:cTn id="26" dur="1" fill="hold">
                                           <p:stCondLst>
                                             <p:cond delay="0"/>
                                           </p:stCondLst>
@@ -34788,26 +34710,26 @@
                     </p:cTn>
                   </p:par>
                   <p:par>
-                    <p:cTn id="29" fill="hold">
+                    <p:cTn id="27" fill="hold">
                       <p:stCondLst>
                         <p:cond delay="indefinite"/>
                       </p:stCondLst>
                       <p:childTnLst>
                         <p:par>
-                          <p:cTn id="30" fill="hold">
+                          <p:cTn id="28" fill="hold">
                             <p:stCondLst>
                               <p:cond delay="0"/>
                             </p:stCondLst>
                             <p:childTnLst>
                               <p:par>
-                                <p:cTn id="31" presetID="1" presetClass="entr" presetSubtype="0" fill="hold" nodeType="clickEffect">
+                                <p:cTn id="29" presetID="1" presetClass="entr" presetSubtype="0" fill="hold" nodeType="clickEffect">
                                   <p:stCondLst>
                                     <p:cond delay="0"/>
                                   </p:stCondLst>
                                   <p:childTnLst>
                                     <p:set>
                                       <p:cBhvr>
-                                        <p:cTn id="32" dur="1" fill="hold">
+                                        <p:cTn id="30" dur="1" fill="hold">
                                           <p:stCondLst>
                                             <p:cond delay="0"/>
                                           </p:stCondLst>
@@ -34837,26 +34759,26 @@
                     </p:cTn>
                   </p:par>
                   <p:par>
-                    <p:cTn id="33" fill="hold">
+                    <p:cTn id="31" fill="hold">
                       <p:stCondLst>
                         <p:cond delay="indefinite"/>
                       </p:stCondLst>
                       <p:childTnLst>
                         <p:par>
-                          <p:cTn id="34" fill="hold">
+                          <p:cTn id="32" fill="hold">
                             <p:stCondLst>
                               <p:cond delay="0"/>
                             </p:stCondLst>
                             <p:childTnLst>
                               <p:par>
-                                <p:cTn id="35" presetID="1" presetClass="entr" presetSubtype="0" fill="hold" nodeType="clickEffect">
+                                <p:cTn id="33" presetID="1" presetClass="entr" presetSubtype="0" fill="hold" nodeType="clickEffect">
                                   <p:stCondLst>
                                     <p:cond delay="0"/>
                                   </p:stCondLst>
                                   <p:childTnLst>
                                     <p:set>
                                       <p:cBhvr>
-                                        <p:cTn id="36" dur="1" fill="hold">
+                                        <p:cTn id="34" dur="1" fill="hold">
                                           <p:stCondLst>
                                             <p:cond delay="0"/>
                                           </p:stCondLst>
@@ -34907,11 +34829,11 @@
       </p:par>
     </p:tnLst>
     <p:bldLst>
-      <p:bldP spid="7" grpId="0" animBg="1"/>
-      <p:bldP spid="8" grpId="0" animBg="1"/>
-      <p:bldP spid="9" grpId="0" animBg="1"/>
-      <p:bldP spid="10" grpId="0" animBg="1"/>
-      <p:bldP spid="11" grpId="0" build="allAtOnce" animBg="1"/>
+      <p:bldP spid="7" grpId="0"/>
+      <p:bldP spid="8" grpId="0"/>
+      <p:bldP spid="9" grpId="0"/>
+      <p:bldP spid="10" grpId="0"/>
+      <p:bldP spid="11" grpId="0" build="allAtOnce"/>
     </p:bldLst>
   </p:timing>
 </p:sld>
@@ -34954,25 +34876,6 @@
               <a:rPr lang="en-US" smtClean="0"/>
               <a:t>Digging Deeper</a:t>
             </a:r>
-          </a:p>
-        </p:txBody>
-      </p:sp>
-      <p:sp>
-        <p:nvSpPr>
-          <p:cNvPr id="6" name="Content Placeholder 5"/>
-          <p:cNvSpPr>
-            <a:spLocks noGrp="1"/>
-          </p:cNvSpPr>
-          <p:nvPr>
-            <p:ph idx="1"/>
-          </p:nvPr>
-        </p:nvSpPr>
-        <p:spPr/>
-        <p:txBody>
-          <a:bodyPr/>
-          <a:lstStyle/>
-          <a:p>
-            <a:endParaRPr lang="en-US"/>
           </a:p>
         </p:txBody>
       </p:sp>
@@ -35303,6 +35206,9 @@
           <a:solidFill>
             <a:srgbClr val="FFFF99"/>
           </a:solidFill>
+          <a:ln>
+            <a:noFill/>
+          </a:ln>
         </p:spPr>
         <p:style>
           <a:lnRef idx="1">
@@ -35419,6 +35325,9 @@
           <a:solidFill>
             <a:srgbClr val="FFFF99"/>
           </a:solidFill>
+          <a:ln>
+            <a:noFill/>
+          </a:ln>
         </p:spPr>
         <p:style>
           <a:lnRef idx="1">
@@ -36249,7 +36158,6 @@
               <a:rPr lang="en-US" smtClean="0"/>
               <a:t>Creating Dynamic Objects</a:t>
             </a:r>
-            <a:endParaRPr lang="en-US" smtClean="0"/>
           </a:p>
         </p:txBody>
       </p:sp>
@@ -36355,10 +36263,6 @@
               </a:rPr>
               <a:t>                  Expression parameter)</a:t>
             </a:r>
-            <a:endParaRPr lang="en-US" dirty="0" smtClean="0">
-              <a:latin typeface="Consolas" pitchFamily="49" charset="0"/>
-              <a:cs typeface="Consolas" pitchFamily="49" charset="0"/>
-            </a:endParaRPr>
           </a:p>
         </p:txBody>
       </p:sp>
@@ -38377,6 +38281,7 @@
               <a:rPr lang="en-US" sz="2200" dirty="0" smtClean="0"/>
               <a:t> </a:t>
             </a:r>
+            <a:endParaRPr lang="en-US" sz="2200" dirty="0" smtClean="0"/>
           </a:p>
           <a:p>
             <a:pPr marL="274320" indent="-274320" eaLnBrk="1" fontAlgn="auto" hangingPunct="1">
@@ -38392,7 +38297,11 @@
             </a:pPr>
             <a:r>
               <a:rPr lang="en-US" sz="2400" i="1" dirty="0" smtClean="0"/>
-              <a:t>C# in Depth</a:t>
+              <a:t>C</a:t>
+            </a:r>
+            <a:r>
+              <a:rPr lang="en-US" sz="2400" i="1" dirty="0" smtClean="0"/>
+              <a:t># in Depth</a:t>
             </a:r>
             <a:r>
               <a:rPr lang="en-US" sz="2400" dirty="0" smtClean="0"/>
@@ -40979,11 +40888,7 @@
             </a:pPr>
             <a:r>
               <a:rPr lang="en-US" dirty="0" smtClean="0"/>
-              <a:t>C</a:t>
-            </a:r>
-            <a:r>
-              <a:rPr lang="en-US" dirty="0" smtClean="0"/>
-              <a:t># 3.0:</a:t>
+              <a:t>C# 3.0:</a:t>
             </a:r>
           </a:p>
           <a:p>

</xml_diff>